<commit_message>
set up ESN_exp02, toy problem for checking prediction performance of ESNs vs CNNLSTM on non-stationary timeseries
</commit_message>
<xml_diff>
--- a/ESN_exp01_BasicESN.pptx
+++ b/ESN_exp01_BasicESN.pptx
@@ -13869,6 +13869,236 @@
               <a:rPr lang="de-DE" dirty="0"/>
               <a:t> 0.2.</a:t>
             </a:r>
+          </a:p>
+        </p:txBody>
+      </p:sp>
+      <p:sp>
+        <p:nvSpPr>
+          <p:cNvPr id="2" name="Textfeld 1">
+            <a:extLst>
+              <a:ext uri="{FF2B5EF4-FFF2-40B4-BE49-F238E27FC236}">
+                <a16:creationId xmlns:a16="http://schemas.microsoft.com/office/drawing/2014/main" id="{03D8803B-0F54-A74C-9C40-DD8D017DC959}"/>
+              </a:ext>
+            </a:extLst>
+          </p:cNvPr>
+          <p:cNvSpPr txBox="1"/>
+          <p:nvPr/>
+        </p:nvSpPr>
+        <p:spPr>
+          <a:xfrm>
+            <a:off x="407773" y="4448432"/>
+            <a:ext cx="3620530" cy="1200329"/>
+          </a:xfrm>
+          <a:prstGeom prst="rect">
+            <a:avLst/>
+          </a:prstGeom>
+          <a:noFill/>
+        </p:spPr>
+        <p:txBody>
+          <a:bodyPr wrap="square" rtlCol="0">
+            <a:spAutoFit/>
+          </a:bodyPr>
+          <a:lstStyle/>
+          <a:p>
+            <a:r>
+              <a:rPr lang="de-DE" dirty="0">
+                <a:sym typeface="Wingdings" pitchFamily="2" charset="2"/>
+              </a:rPr>
+              <a:t> </a:t>
+            </a:r>
+            <a:r>
+              <a:rPr lang="de-DE" dirty="0" err="1">
+                <a:sym typeface="Wingdings" pitchFamily="2" charset="2"/>
+              </a:rPr>
+              <a:t>That</a:t>
+            </a:r>
+            <a:r>
+              <a:rPr lang="de-DE" dirty="0">
+                <a:sym typeface="Wingdings" pitchFamily="2" charset="2"/>
+              </a:rPr>
+              <a:t> </a:t>
+            </a:r>
+            <a:r>
+              <a:rPr lang="de-DE" dirty="0" err="1">
+                <a:sym typeface="Wingdings" pitchFamily="2" charset="2"/>
+              </a:rPr>
+              <a:t>really</a:t>
+            </a:r>
+            <a:r>
+              <a:rPr lang="de-DE" dirty="0">
+                <a:sym typeface="Wingdings" pitchFamily="2" charset="2"/>
+              </a:rPr>
+              <a:t> </a:t>
+            </a:r>
+            <a:r>
+              <a:rPr lang="de-DE" dirty="0" err="1">
+                <a:sym typeface="Wingdings" pitchFamily="2" charset="2"/>
+              </a:rPr>
+              <a:t>broad</a:t>
+            </a:r>
+            <a:r>
+              <a:rPr lang="de-DE" dirty="0">
+                <a:sym typeface="Wingdings" pitchFamily="2" charset="2"/>
+              </a:rPr>
+              <a:t> </a:t>
+            </a:r>
+            <a:r>
+              <a:rPr lang="de-DE" dirty="0" err="1">
+                <a:sym typeface="Wingdings" pitchFamily="2" charset="2"/>
+              </a:rPr>
+              <a:t>range</a:t>
+            </a:r>
+            <a:r>
+              <a:rPr lang="de-DE" dirty="0">
+                <a:sym typeface="Wingdings" pitchFamily="2" charset="2"/>
+              </a:rPr>
+              <a:t> </a:t>
+            </a:r>
+            <a:r>
+              <a:rPr lang="de-DE" dirty="0" err="1">
+                <a:sym typeface="Wingdings" pitchFamily="2" charset="2"/>
+              </a:rPr>
+              <a:t>of</a:t>
+            </a:r>
+            <a:r>
+              <a:rPr lang="de-DE" dirty="0">
+                <a:sym typeface="Wingdings" pitchFamily="2" charset="2"/>
+              </a:rPr>
+              <a:t> </a:t>
+            </a:r>
+            <a:r>
+              <a:rPr lang="de-DE" dirty="0" err="1">
+                <a:sym typeface="Wingdings" pitchFamily="2" charset="2"/>
+              </a:rPr>
+              <a:t>output</a:t>
+            </a:r>
+            <a:r>
+              <a:rPr lang="de-DE" dirty="0">
+                <a:sym typeface="Wingdings" pitchFamily="2" charset="2"/>
+              </a:rPr>
+              <a:t> </a:t>
+            </a:r>
+            <a:r>
+              <a:rPr lang="de-DE" dirty="0" err="1">
+                <a:sym typeface="Wingdings" pitchFamily="2" charset="2"/>
+              </a:rPr>
+              <a:t>weights</a:t>
+            </a:r>
+            <a:r>
+              <a:rPr lang="de-DE" dirty="0">
+                <a:sym typeface="Wingdings" pitchFamily="2" charset="2"/>
+              </a:rPr>
+              <a:t> </a:t>
+            </a:r>
+            <a:r>
+              <a:rPr lang="de-DE" dirty="0" err="1">
+                <a:sym typeface="Wingdings" pitchFamily="2" charset="2"/>
+              </a:rPr>
+              <a:t>needs</a:t>
+            </a:r>
+            <a:r>
+              <a:rPr lang="de-DE" dirty="0">
+                <a:sym typeface="Wingdings" pitchFamily="2" charset="2"/>
+              </a:rPr>
+              <a:t> </a:t>
+            </a:r>
+            <a:r>
+              <a:rPr lang="de-DE" dirty="0" err="1">
+                <a:sym typeface="Wingdings" pitchFamily="2" charset="2"/>
+              </a:rPr>
+              <a:t>to</a:t>
+            </a:r>
+            <a:r>
+              <a:rPr lang="de-DE" dirty="0">
+                <a:sym typeface="Wingdings" pitchFamily="2" charset="2"/>
+              </a:rPr>
+              <a:t> </a:t>
+            </a:r>
+            <a:r>
+              <a:rPr lang="de-DE" dirty="0" err="1">
+                <a:sym typeface="Wingdings" pitchFamily="2" charset="2"/>
+              </a:rPr>
+              <a:t>be</a:t>
+            </a:r>
+            <a:r>
+              <a:rPr lang="de-DE" dirty="0">
+                <a:sym typeface="Wingdings" pitchFamily="2" charset="2"/>
+              </a:rPr>
+              <a:t> </a:t>
+            </a:r>
+            <a:r>
+              <a:rPr lang="de-DE" dirty="0" err="1">
+                <a:sym typeface="Wingdings" pitchFamily="2" charset="2"/>
+              </a:rPr>
+              <a:t>further</a:t>
+            </a:r>
+            <a:r>
+              <a:rPr lang="de-DE" dirty="0">
+                <a:sym typeface="Wingdings" pitchFamily="2" charset="2"/>
+              </a:rPr>
+              <a:t> </a:t>
+            </a:r>
+            <a:r>
+              <a:rPr lang="de-DE" dirty="0" err="1">
+                <a:sym typeface="Wingdings" pitchFamily="2" charset="2"/>
+              </a:rPr>
+              <a:t>investigated</a:t>
+            </a:r>
+            <a:r>
+              <a:rPr lang="de-DE" dirty="0">
+                <a:sym typeface="Wingdings" pitchFamily="2" charset="2"/>
+              </a:rPr>
+              <a:t>! </a:t>
+            </a:r>
+            <a:r>
+              <a:rPr lang="de-DE" dirty="0" err="1">
+                <a:sym typeface="Wingdings" pitchFamily="2" charset="2"/>
+              </a:rPr>
+              <a:t>Expected</a:t>
+            </a:r>
+            <a:r>
+              <a:rPr lang="de-DE" dirty="0">
+                <a:sym typeface="Wingdings" pitchFamily="2" charset="2"/>
+              </a:rPr>
+              <a:t> </a:t>
+            </a:r>
+            <a:r>
+              <a:rPr lang="de-DE" dirty="0" err="1">
+                <a:sym typeface="Wingdings" pitchFamily="2" charset="2"/>
+              </a:rPr>
+              <a:t>something</a:t>
+            </a:r>
+            <a:r>
+              <a:rPr lang="de-DE" dirty="0">
+                <a:sym typeface="Wingdings" pitchFamily="2" charset="2"/>
+              </a:rPr>
+              <a:t> in </a:t>
+            </a:r>
+            <a:r>
+              <a:rPr lang="de-DE" dirty="0" err="1">
+                <a:sym typeface="Wingdings" pitchFamily="2" charset="2"/>
+              </a:rPr>
+              <a:t>the</a:t>
+            </a:r>
+            <a:r>
+              <a:rPr lang="de-DE" dirty="0">
+                <a:sym typeface="Wingdings" pitchFamily="2" charset="2"/>
+              </a:rPr>
+              <a:t> </a:t>
+            </a:r>
+            <a:r>
+              <a:rPr lang="de-DE" dirty="0" err="1">
+                <a:sym typeface="Wingdings" pitchFamily="2" charset="2"/>
+              </a:rPr>
+              <a:t>range</a:t>
+            </a:r>
+            <a:r>
+              <a:rPr lang="de-DE" dirty="0">
+                <a:sym typeface="Wingdings" pitchFamily="2" charset="2"/>
+              </a:rPr>
+              <a:t> [-1,1].</a:t>
+            </a:r>
+            <a:endParaRPr lang="de-DE" dirty="0"/>
           </a:p>
         </p:txBody>
       </p:sp>

</xml_diff>

<commit_message>
updated presentations on exp01 and exp02
</commit_message>
<xml_diff>
--- a/ESN_exp01_BasicESN.pptx
+++ b/ESN_exp01_BasicESN.pptx
@@ -216,7 +216,7 @@
           <a:p>
             <a:fld id="{3AB76ABC-33D1-9C41-94E4-617AD2CE1B7F}" type="datetimeFigureOut">
               <a:rPr lang="de-DE" smtClean="0"/>
-              <a:t>09.02.22</a:t>
+              <a:t>11.02.22</a:t>
             </a:fld>
             <a:endParaRPr lang="de-DE"/>
           </a:p>
@@ -1311,7 +1311,7 @@
           <a:p>
             <a:fld id="{4A66F40E-0BE7-7441-94CB-0CED3EF25F1E}" type="datetimeFigureOut">
               <a:rPr lang="de-DE" smtClean="0"/>
-              <a:t>09.02.22</a:t>
+              <a:t>11.02.22</a:t>
             </a:fld>
             <a:endParaRPr lang="de-DE"/>
           </a:p>
@@ -1509,7 +1509,7 @@
           <a:p>
             <a:fld id="{4A66F40E-0BE7-7441-94CB-0CED3EF25F1E}" type="datetimeFigureOut">
               <a:rPr lang="de-DE" smtClean="0"/>
-              <a:t>09.02.22</a:t>
+              <a:t>11.02.22</a:t>
             </a:fld>
             <a:endParaRPr lang="de-DE"/>
           </a:p>
@@ -1717,7 +1717,7 @@
           <a:p>
             <a:fld id="{4A66F40E-0BE7-7441-94CB-0CED3EF25F1E}" type="datetimeFigureOut">
               <a:rPr lang="de-DE" smtClean="0"/>
-              <a:t>09.02.22</a:t>
+              <a:t>11.02.22</a:t>
             </a:fld>
             <a:endParaRPr lang="de-DE"/>
           </a:p>
@@ -1915,7 +1915,7 @@
           <a:p>
             <a:fld id="{4A66F40E-0BE7-7441-94CB-0CED3EF25F1E}" type="datetimeFigureOut">
               <a:rPr lang="de-DE" smtClean="0"/>
-              <a:t>09.02.22</a:t>
+              <a:t>11.02.22</a:t>
             </a:fld>
             <a:endParaRPr lang="de-DE"/>
           </a:p>
@@ -2190,7 +2190,7 @@
           <a:p>
             <a:fld id="{4A66F40E-0BE7-7441-94CB-0CED3EF25F1E}" type="datetimeFigureOut">
               <a:rPr lang="de-DE" smtClean="0"/>
-              <a:t>09.02.22</a:t>
+              <a:t>11.02.22</a:t>
             </a:fld>
             <a:endParaRPr lang="de-DE"/>
           </a:p>
@@ -2455,7 +2455,7 @@
           <a:p>
             <a:fld id="{4A66F40E-0BE7-7441-94CB-0CED3EF25F1E}" type="datetimeFigureOut">
               <a:rPr lang="de-DE" smtClean="0"/>
-              <a:t>09.02.22</a:t>
+              <a:t>11.02.22</a:t>
             </a:fld>
             <a:endParaRPr lang="de-DE"/>
           </a:p>
@@ -2867,7 +2867,7 @@
           <a:p>
             <a:fld id="{4A66F40E-0BE7-7441-94CB-0CED3EF25F1E}" type="datetimeFigureOut">
               <a:rPr lang="de-DE" smtClean="0"/>
-              <a:t>09.02.22</a:t>
+              <a:t>11.02.22</a:t>
             </a:fld>
             <a:endParaRPr lang="de-DE"/>
           </a:p>
@@ -3008,7 +3008,7 @@
           <a:p>
             <a:fld id="{4A66F40E-0BE7-7441-94CB-0CED3EF25F1E}" type="datetimeFigureOut">
               <a:rPr lang="de-DE" smtClean="0"/>
-              <a:t>09.02.22</a:t>
+              <a:t>11.02.22</a:t>
             </a:fld>
             <a:endParaRPr lang="de-DE"/>
           </a:p>
@@ -3121,7 +3121,7 @@
           <a:p>
             <a:fld id="{4A66F40E-0BE7-7441-94CB-0CED3EF25F1E}" type="datetimeFigureOut">
               <a:rPr lang="de-DE" smtClean="0"/>
-              <a:t>09.02.22</a:t>
+              <a:t>11.02.22</a:t>
             </a:fld>
             <a:endParaRPr lang="de-DE"/>
           </a:p>
@@ -3432,7 +3432,7 @@
           <a:p>
             <a:fld id="{4A66F40E-0BE7-7441-94CB-0CED3EF25F1E}" type="datetimeFigureOut">
               <a:rPr lang="de-DE" smtClean="0"/>
-              <a:t>09.02.22</a:t>
+              <a:t>11.02.22</a:t>
             </a:fld>
             <a:endParaRPr lang="de-DE"/>
           </a:p>
@@ -3720,7 +3720,7 @@
           <a:p>
             <a:fld id="{4A66F40E-0BE7-7441-94CB-0CED3EF25F1E}" type="datetimeFigureOut">
               <a:rPr lang="de-DE" smtClean="0"/>
-              <a:t>09.02.22</a:t>
+              <a:t>11.02.22</a:t>
             </a:fld>
             <a:endParaRPr lang="de-DE"/>
           </a:p>
@@ -3961,7 +3961,7 @@
           <a:p>
             <a:fld id="{4A66F40E-0BE7-7441-94CB-0CED3EF25F1E}" type="datetimeFigureOut">
               <a:rPr lang="de-DE" smtClean="0"/>
-              <a:t>09.02.22</a:t>
+              <a:t>11.02.22</a:t>
             </a:fld>
             <a:endParaRPr lang="de-DE"/>
           </a:p>
@@ -11590,7 +11590,7 @@
         <p:spPr>
           <a:xfrm>
             <a:off x="488197" y="4870587"/>
-            <a:ext cx="11387428" cy="1477328"/>
+            <a:ext cx="11387428" cy="1754326"/>
           </a:xfrm>
           <a:prstGeom prst="rect">
             <a:avLst/>
@@ -11719,7 +11719,43 @@
             </a:r>
             <a:r>
               <a:rPr lang="de-DE" dirty="0" err="1"/>
-              <a:t>determines</a:t>
+              <a:t>defines</a:t>
+            </a:r>
+            <a:r>
+              <a:rPr lang="de-DE" dirty="0"/>
+              <a:t> </a:t>
+            </a:r>
+            <a:r>
+              <a:rPr lang="de-DE" dirty="0" err="1"/>
+              <a:t>largest</a:t>
+            </a:r>
+            <a:r>
+              <a:rPr lang="de-DE" dirty="0"/>
+              <a:t> Eigenvalue </a:t>
+            </a:r>
+            <a:r>
+              <a:rPr lang="de-DE" dirty="0" err="1"/>
+              <a:t>of</a:t>
+            </a:r>
+            <a:r>
+              <a:rPr lang="de-DE" dirty="0"/>
+              <a:t> </a:t>
+            </a:r>
+            <a:r>
+              <a:rPr lang="de-DE" dirty="0" err="1"/>
+              <a:t>W_res</a:t>
+            </a:r>
+            <a:r>
+              <a:rPr lang="de-DE" dirty="0"/>
+              <a:t> </a:t>
+            </a:r>
+            <a:r>
+              <a:rPr lang="de-DE" dirty="0" err="1"/>
+              <a:t>and</a:t>
+            </a:r>
+            <a:r>
+              <a:rPr lang="de-DE"/>
+              <a:t> determines</a:t>
             </a:r>
             <a:r>
               <a:rPr lang="de-DE" dirty="0"/>

</xml_diff>